<commit_message>
sensor workshop begin 3
</commit_message>
<xml_diff>
--- a/Sensors_Osc Workshop/Workshop_presentation.pptx
+++ b/Sensors_Osc Workshop/Workshop_presentation.pptx
@@ -13,10 +13,11 @@
     <p:sldId id="266" r:id="rId7"/>
     <p:sldId id="269" r:id="rId8"/>
     <p:sldId id="270" r:id="rId9"/>
-    <p:sldId id="258" r:id="rId10"/>
-    <p:sldId id="264" r:id="rId11"/>
-    <p:sldId id="261" r:id="rId12"/>
-    <p:sldId id="268" r:id="rId13"/>
+    <p:sldId id="271" r:id="rId10"/>
+    <p:sldId id="258" r:id="rId11"/>
+    <p:sldId id="264" r:id="rId12"/>
+    <p:sldId id="261" r:id="rId13"/>
+    <p:sldId id="268" r:id="rId14"/>
   </p:sldIdLst>
   <p:sldSz cx="12192000" cy="6858000"/>
   <p:notesSz cx="6858000" cy="9144000"/>
@@ -4029,7 +4030,7 @@
             <a:fld id="{B61BEF0D-F0BB-DE4B-95CE-6DB70DBA9567}" type="datetimeFigureOut">
               <a:rPr lang="en-US" smtClean="0"/>
               <a:pPr/>
-              <a:t>4/16/2024</a:t>
+              <a:t>4/17/2024</a:t>
             </a:fld>
             <a:endParaRPr lang="en-US" dirty="0"/>
           </a:p>
@@ -5013,7 +5014,7 @@
             <a:fld id="{B61BEF0D-F0BB-DE4B-95CE-6DB70DBA9567}" type="datetimeFigureOut">
               <a:rPr lang="en-US" smtClean="0"/>
               <a:pPr/>
-              <a:t>4/16/2024</a:t>
+              <a:t>4/17/2024</a:t>
             </a:fld>
             <a:endParaRPr lang="en-US" dirty="0"/>
           </a:p>
@@ -5885,7 +5886,7 @@
             <a:fld id="{B61BEF0D-F0BB-DE4B-95CE-6DB70DBA9567}" type="datetimeFigureOut">
               <a:rPr lang="en-US" smtClean="0"/>
               <a:pPr/>
-              <a:t>4/16/2024</a:t>
+              <a:t>4/17/2024</a:t>
             </a:fld>
             <a:endParaRPr lang="en-US" dirty="0"/>
           </a:p>
@@ -6908,7 +6909,7 @@
             <a:fld id="{B61BEF0D-F0BB-DE4B-95CE-6DB70DBA9567}" type="datetimeFigureOut">
               <a:rPr lang="en-US" smtClean="0"/>
               <a:pPr/>
-              <a:t>4/16/2024</a:t>
+              <a:t>4/17/2024</a:t>
             </a:fld>
             <a:endParaRPr lang="en-US" dirty="0"/>
           </a:p>
@@ -7830,7 +7831,7 @@
             <a:fld id="{B61BEF0D-F0BB-DE4B-95CE-6DB70DBA9567}" type="datetimeFigureOut">
               <a:rPr lang="en-US" smtClean="0"/>
               <a:pPr/>
-              <a:t>4/16/2024</a:t>
+              <a:t>4/17/2024</a:t>
             </a:fld>
             <a:endParaRPr lang="en-US" dirty="0"/>
           </a:p>
@@ -8488,7 +8489,7 @@
             <a:fld id="{B61BEF0D-F0BB-DE4B-95CE-6DB70DBA9567}" type="datetimeFigureOut">
               <a:rPr lang="en-US" smtClean="0"/>
               <a:pPr/>
-              <a:t>4/16/2024</a:t>
+              <a:t>4/17/2024</a:t>
             </a:fld>
             <a:endParaRPr lang="en-US" dirty="0"/>
           </a:p>
@@ -9347,7 +9348,7 @@
             <a:fld id="{B61BEF0D-F0BB-DE4B-95CE-6DB70DBA9567}" type="datetimeFigureOut">
               <a:rPr lang="en-US" smtClean="0"/>
               <a:pPr/>
-              <a:t>4/16/2024</a:t>
+              <a:t>4/17/2024</a:t>
             </a:fld>
             <a:endParaRPr lang="en-US" dirty="0"/>
           </a:p>
@@ -9532,7 +9533,7 @@
             <a:fld id="{B61BEF0D-F0BB-DE4B-95CE-6DB70DBA9567}" type="datetimeFigureOut">
               <a:rPr lang="en-US" smtClean="0"/>
               <a:pPr/>
-              <a:t>4/16/2024</a:t>
+              <a:t>4/17/2024</a:t>
             </a:fld>
             <a:endParaRPr lang="en-US" dirty="0"/>
           </a:p>
@@ -10391,7 +10392,7 @@
             <a:fld id="{B61BEF0D-F0BB-DE4B-95CE-6DB70DBA9567}" type="datetimeFigureOut">
               <a:rPr lang="en-US" smtClean="0"/>
               <a:pPr/>
-              <a:t>4/16/2024</a:t>
+              <a:t>4/17/2024</a:t>
             </a:fld>
             <a:endParaRPr lang="en-US" dirty="0"/>
           </a:p>
@@ -10618,7 +10619,7 @@
             <a:fld id="{B61BEF0D-F0BB-DE4B-95CE-6DB70DBA9567}" type="datetimeFigureOut">
               <a:rPr lang="en-US" smtClean="0"/>
               <a:pPr/>
-              <a:t>4/16/2024</a:t>
+              <a:t>4/17/2024</a:t>
             </a:fld>
             <a:endParaRPr lang="en-US" dirty="0"/>
           </a:p>
@@ -11545,7 +11546,7 @@
             <a:fld id="{B61BEF0D-F0BB-DE4B-95CE-6DB70DBA9567}" type="datetimeFigureOut">
               <a:rPr lang="en-US" smtClean="0"/>
               <a:pPr/>
-              <a:t>4/16/2024</a:t>
+              <a:t>4/17/2024</a:t>
             </a:fld>
             <a:endParaRPr lang="en-US" dirty="0"/>
           </a:p>
@@ -11831,7 +11832,7 @@
             <a:fld id="{B61BEF0D-F0BB-DE4B-95CE-6DB70DBA9567}" type="datetimeFigureOut">
               <a:rPr lang="en-US" smtClean="0"/>
               <a:pPr/>
-              <a:t>4/16/2024</a:t>
+              <a:t>4/17/2024</a:t>
             </a:fld>
             <a:endParaRPr lang="en-US" dirty="0"/>
           </a:p>
@@ -12223,7 +12224,7 @@
             <a:fld id="{B61BEF0D-F0BB-DE4B-95CE-6DB70DBA9567}" type="datetimeFigureOut">
               <a:rPr lang="en-US" smtClean="0"/>
               <a:pPr/>
-              <a:t>4/16/2024</a:t>
+              <a:t>4/17/2024</a:t>
             </a:fld>
             <a:endParaRPr lang="en-US" dirty="0"/>
           </a:p>
@@ -12351,7 +12352,7 @@
             <a:fld id="{B61BEF0D-F0BB-DE4B-95CE-6DB70DBA9567}" type="datetimeFigureOut">
               <a:rPr lang="en-US" smtClean="0"/>
               <a:pPr/>
-              <a:t>4/16/2024</a:t>
+              <a:t>4/17/2024</a:t>
             </a:fld>
             <a:endParaRPr lang="en-US" dirty="0"/>
           </a:p>
@@ -12448,7 +12449,7 @@
             <a:fld id="{B61BEF0D-F0BB-DE4B-95CE-6DB70DBA9567}" type="datetimeFigureOut">
               <a:rPr lang="en-US" smtClean="0"/>
               <a:pPr/>
-              <a:t>4/16/2024</a:t>
+              <a:t>4/17/2024</a:t>
             </a:fld>
             <a:endParaRPr lang="en-US" dirty="0"/>
           </a:p>
@@ -13421,7 +13422,7 @@
             <a:fld id="{B61BEF0D-F0BB-DE4B-95CE-6DB70DBA9567}" type="datetimeFigureOut">
               <a:rPr lang="en-US" smtClean="0"/>
               <a:pPr/>
-              <a:t>4/16/2024</a:t>
+              <a:t>4/17/2024</a:t>
             </a:fld>
             <a:endParaRPr lang="en-US" dirty="0"/>
           </a:p>
@@ -14418,7 +14419,7 @@
             <a:fld id="{B61BEF0D-F0BB-DE4B-95CE-6DB70DBA9567}" type="datetimeFigureOut">
               <a:rPr lang="en-US" smtClean="0"/>
               <a:pPr/>
-              <a:t>4/16/2024</a:t>
+              <a:t>4/17/2024</a:t>
             </a:fld>
             <a:endParaRPr lang="en-US" dirty="0"/>
           </a:p>
@@ -15304,7 +15305,7 @@
             <a:fld id="{B61BEF0D-F0BB-DE4B-95CE-6DB70DBA9567}" type="datetimeFigureOut">
               <a:rPr lang="en-US" smtClean="0"/>
               <a:pPr/>
-              <a:t>4/16/2024</a:t>
+              <a:t>4/17/2024</a:t>
             </a:fld>
             <a:endParaRPr lang="en-US" dirty="0"/>
           </a:p>
@@ -16554,6 +16555,147 @@
           <a:chExt cx="0" cy="0"/>
         </a:xfrm>
       </p:grpSpPr>
+      <p:sp>
+        <p:nvSpPr>
+          <p:cNvPr id="2" name="Title 1">
+            <a:extLst>
+              <a:ext uri="{FF2B5EF4-FFF2-40B4-BE49-F238E27FC236}">
+                <a16:creationId xmlns:a16="http://schemas.microsoft.com/office/drawing/2014/main" id="{1456509C-DE2D-E29A-0641-3ADFB676E85C}"/>
+              </a:ext>
+            </a:extLst>
+          </p:cNvPr>
+          <p:cNvSpPr>
+            <a:spLocks noGrp="1"/>
+          </p:cNvSpPr>
+          <p:nvPr>
+            <p:ph type="title"/>
+          </p:nvPr>
+        </p:nvSpPr>
+        <p:spPr>
+          <a:xfrm>
+            <a:off x="1154954" y="973669"/>
+            <a:ext cx="8825659" cy="706964"/>
+          </a:xfrm>
+        </p:spPr>
+        <p:txBody>
+          <a:bodyPr>
+            <a:normAutofit/>
+          </a:bodyPr>
+          <a:lstStyle/>
+          <a:p>
+            <a:r>
+              <a:rPr lang="en-GB" dirty="0"/>
+              <a:t>Git repository for these workshops</a:t>
+            </a:r>
+          </a:p>
+        </p:txBody>
+      </p:sp>
+      <p:sp>
+        <p:nvSpPr>
+          <p:cNvPr id="3" name="Content Placeholder 2">
+            <a:extLst>
+              <a:ext uri="{FF2B5EF4-FFF2-40B4-BE49-F238E27FC236}">
+                <a16:creationId xmlns:a16="http://schemas.microsoft.com/office/drawing/2014/main" id="{81E36EF8-C069-FFA9-CB2B-B4827089AB45}"/>
+              </a:ext>
+            </a:extLst>
+          </p:cNvPr>
+          <p:cNvSpPr>
+            <a:spLocks noGrp="1"/>
+          </p:cNvSpPr>
+          <p:nvPr>
+            <p:ph idx="1"/>
+          </p:nvPr>
+        </p:nvSpPr>
+        <p:spPr>
+          <a:xfrm>
+            <a:off x="5980954" y="2603500"/>
+            <a:ext cx="5211979" cy="3416300"/>
+          </a:xfrm>
+        </p:spPr>
+        <p:txBody>
+          <a:bodyPr anchor="ctr">
+            <a:normAutofit/>
+          </a:bodyPr>
+          <a:lstStyle/>
+          <a:p>
+            <a:r>
+              <a:rPr lang="en-GB" dirty="0"/>
+              <a:t>https://github.com/Rauleal/TouchDesigner_Bauhaus_workshop</a:t>
+            </a:r>
+          </a:p>
+          <a:p>
+            <a:endParaRPr lang="en-GB" dirty="0"/>
+          </a:p>
+        </p:txBody>
+      </p:sp>
+      <p:pic>
+        <p:nvPicPr>
+          <p:cNvPr id="6" name="Picture 5" descr="A qr code on a white background&#10;&#10;Description automatically generated">
+            <a:extLst>
+              <a:ext uri="{FF2B5EF4-FFF2-40B4-BE49-F238E27FC236}">
+                <a16:creationId xmlns:a16="http://schemas.microsoft.com/office/drawing/2014/main" id="{7F3F36FB-32F6-47C0-4108-C5CB112991F6}"/>
+              </a:ext>
+            </a:extLst>
+          </p:cNvPr>
+          <p:cNvPicPr>
+            <a:picLocks noChangeAspect="1"/>
+          </p:cNvPicPr>
+          <p:nvPr/>
+        </p:nvPicPr>
+        <p:blipFill>
+          <a:blip r:embed="rId2"/>
+          <a:stretch>
+            <a:fillRect/>
+          </a:stretch>
+        </p:blipFill>
+        <p:spPr>
+          <a:xfrm>
+            <a:off x="1660570" y="2696005"/>
+            <a:ext cx="3188326" cy="3188326"/>
+          </a:xfrm>
+          <a:prstGeom prst="rect">
+            <a:avLst/>
+          </a:prstGeom>
+        </p:spPr>
+      </p:pic>
+    </p:spTree>
+    <p:extLst>
+      <p:ext uri="{BB962C8B-B14F-4D97-AF65-F5344CB8AC3E}">
+        <p14:creationId xmlns:p14="http://schemas.microsoft.com/office/powerpoint/2010/main" val="22761770"/>
+      </p:ext>
+    </p:extLst>
+  </p:cSld>
+  <p:clrMapOvr>
+    <a:masterClrMapping/>
+  </p:clrMapOvr>
+</p:sld>
+</file>
+
+<file path=ppt/slides/slide11.xml><?xml version="1.0" encoding="utf-8"?>
+<p:sld xmlns:a="http://schemas.openxmlformats.org/drawingml/2006/main" xmlns:r="http://schemas.openxmlformats.org/officeDocument/2006/relationships" xmlns:p="http://schemas.openxmlformats.org/presentationml/2006/main">
+  <p:cSld>
+    <p:bg>
+      <p:bgPr>
+        <a:solidFill>
+          <a:schemeClr val="bg1"/>
+        </a:solidFill>
+        <a:effectLst/>
+      </p:bgPr>
+    </p:bg>
+    <p:spTree>
+      <p:nvGrpSpPr>
+        <p:cNvPr id="1" name=""/>
+        <p:cNvGrpSpPr/>
+        <p:nvPr/>
+      </p:nvGrpSpPr>
+      <p:grpSpPr>
+        <a:xfrm>
+          <a:off x="0" y="0"/>
+          <a:ext cx="0" cy="0"/>
+          <a:chOff x="0" y="0"/>
+          <a:chExt cx="0" cy="0"/>
+        </a:xfrm>
+      </p:grpSpPr>
       <p:grpSp>
         <p:nvGrpSpPr>
           <p:cNvPr id="15" name="Group 14">
@@ -17703,7 +17845,7 @@
 </p:sld>
 </file>
 
-<file path=ppt/slides/slide11.xml><?xml version="1.0" encoding="utf-8"?>
+<file path=ppt/slides/slide12.xml><?xml version="1.0" encoding="utf-8"?>
 <p:sld xmlns:a="http://schemas.openxmlformats.org/drawingml/2006/main" xmlns:r="http://schemas.openxmlformats.org/officeDocument/2006/relationships" xmlns:p="http://schemas.openxmlformats.org/presentationml/2006/main">
   <p:cSld>
     <p:bg>
@@ -18786,7 +18928,7 @@
 </p:sld>
 </file>
 
-<file path=ppt/slides/slide12.xml><?xml version="1.0" encoding="utf-8"?>
+<file path=ppt/slides/slide13.xml><?xml version="1.0" encoding="utf-8"?>
 <p:sld xmlns:a="http://schemas.openxmlformats.org/drawingml/2006/main" xmlns:r="http://schemas.openxmlformats.org/officeDocument/2006/relationships" xmlns:p="http://schemas.openxmlformats.org/presentationml/2006/main">
   <p:cSld>
     <p:spTree>
@@ -21429,14 +21571,6 @@
 <file path=ppt/slides/slide9.xml><?xml version="1.0" encoding="utf-8"?>
 <p:sld xmlns:a="http://schemas.openxmlformats.org/drawingml/2006/main" xmlns:r="http://schemas.openxmlformats.org/officeDocument/2006/relationships" xmlns:p="http://schemas.openxmlformats.org/presentationml/2006/main">
   <p:cSld>
-    <p:bg>
-      <p:bgPr>
-        <a:solidFill>
-          <a:schemeClr val="bg1"/>
-        </a:solidFill>
-        <a:effectLst/>
-      </p:bgPr>
-    </p:bg>
     <p:spTree>
       <p:nvGrpSpPr>
         <p:cNvPr id="1" name=""/>
@@ -21456,7 +21590,7 @@
           <p:cNvPr id="2" name="Title 1">
             <a:extLst>
               <a:ext uri="{FF2B5EF4-FFF2-40B4-BE49-F238E27FC236}">
-                <a16:creationId xmlns:a16="http://schemas.microsoft.com/office/drawing/2014/main" id="{1456509C-DE2D-E29A-0641-3ADFB676E85C}"/>
+                <a16:creationId xmlns:a16="http://schemas.microsoft.com/office/drawing/2014/main" id="{193AFAB8-E10D-7EF0-B980-103D1C3B8F73}"/>
               </a:ext>
             </a:extLst>
           </p:cNvPr>
@@ -21467,22 +21601,16 @@
             <p:ph type="title"/>
           </p:nvPr>
         </p:nvSpPr>
-        <p:spPr>
-          <a:xfrm>
-            <a:off x="1154954" y="973669"/>
-            <a:ext cx="8825659" cy="706964"/>
-          </a:xfrm>
-        </p:spPr>
+        <p:spPr/>
         <p:txBody>
-          <a:bodyPr>
-            <a:normAutofit/>
-          </a:bodyPr>
+          <a:bodyPr/>
           <a:lstStyle/>
           <a:p>
             <a:r>
-              <a:rPr lang="en-GB" dirty="0"/>
-              <a:t>Git repository for these workshops</a:t>
+              <a:rPr lang="en-US" dirty="0"/>
+              <a:t>ESP8266 Installation</a:t>
             </a:r>
+            <a:endParaRPr lang="en-NL" dirty="0"/>
           </a:p>
         </p:txBody>
       </p:sp>
@@ -21491,7 +21619,7 @@
           <p:cNvPr id="3" name="Content Placeholder 2">
             <a:extLst>
               <a:ext uri="{FF2B5EF4-FFF2-40B4-BE49-F238E27FC236}">
-                <a16:creationId xmlns:a16="http://schemas.microsoft.com/office/drawing/2014/main" id="{81E36EF8-C069-FFA9-CB2B-B4827089AB45}"/>
+                <a16:creationId xmlns:a16="http://schemas.microsoft.com/office/drawing/2014/main" id="{CFC26745-D531-A944-8A9D-CBF8E60575AB}"/>
               </a:ext>
             </a:extLst>
           </p:cNvPr>
@@ -21502,62 +21630,45 @@
             <p:ph idx="1"/>
           </p:nvPr>
         </p:nvSpPr>
-        <p:spPr>
-          <a:xfrm>
-            <a:off x="5980954" y="2603500"/>
-            <a:ext cx="5211979" cy="3416300"/>
-          </a:xfrm>
-        </p:spPr>
+        <p:spPr/>
         <p:txBody>
-          <a:bodyPr anchor="ctr">
-            <a:normAutofit/>
-          </a:bodyPr>
+          <a:bodyPr/>
           <a:lstStyle/>
           <a:p>
             <a:r>
-              <a:rPr lang="en-GB" dirty="0"/>
-              <a:t>https://github.com/Rauleal/TouchDesigner_Bauhaus_workshop</a:t>
+              <a:rPr lang="en-US" dirty="0"/>
+              <a:t>Follow installation instructions here </a:t>
             </a:r>
+            <a:r>
+              <a:rPr lang="en-US" dirty="0">
+                <a:hlinkClick r:id="rId2"/>
+              </a:rPr>
+              <a:t>https://randomnerdtutorials.com/how-to-install-esp8266-board-arduino-ide/</a:t>
+            </a:r>
+            <a:endParaRPr lang="en-US" dirty="0"/>
           </a:p>
           <a:p>
-            <a:endParaRPr lang="en-GB" dirty="0"/>
+            <a:pPr lvl="1"/>
+            <a:r>
+              <a:rPr lang="en-US" dirty="0"/>
+              <a:t>If you can not find the port install the </a:t>
+            </a:r>
+            <a:r>
+              <a:rPr lang="en-US" dirty="0" err="1"/>
+              <a:t>usb</a:t>
+            </a:r>
+            <a:r>
+              <a:rPr lang="en-US" dirty="0"/>
+              <a:t> drivers alsohttps://randomnerdtutorials.com/install-esp32-esp8266-usb-drivers-cp210x-windows/</a:t>
+            </a:r>
+            <a:endParaRPr lang="en-NL" dirty="0"/>
           </a:p>
         </p:txBody>
       </p:sp>
-      <p:pic>
-        <p:nvPicPr>
-          <p:cNvPr id="6" name="Picture 5" descr="A qr code on a white background&#10;&#10;Description automatically generated">
-            <a:extLst>
-              <a:ext uri="{FF2B5EF4-FFF2-40B4-BE49-F238E27FC236}">
-                <a16:creationId xmlns:a16="http://schemas.microsoft.com/office/drawing/2014/main" id="{7F3F36FB-32F6-47C0-4108-C5CB112991F6}"/>
-              </a:ext>
-            </a:extLst>
-          </p:cNvPr>
-          <p:cNvPicPr>
-            <a:picLocks noChangeAspect="1"/>
-          </p:cNvPicPr>
-          <p:nvPr/>
-        </p:nvPicPr>
-        <p:blipFill>
-          <a:blip r:embed="rId2"/>
-          <a:stretch>
-            <a:fillRect/>
-          </a:stretch>
-        </p:blipFill>
-        <p:spPr>
-          <a:xfrm>
-            <a:off x="1660570" y="2696005"/>
-            <a:ext cx="3188326" cy="3188326"/>
-          </a:xfrm>
-          <a:prstGeom prst="rect">
-            <a:avLst/>
-          </a:prstGeom>
-        </p:spPr>
-      </p:pic>
     </p:spTree>
     <p:extLst>
       <p:ext uri="{BB962C8B-B14F-4D97-AF65-F5344CB8AC3E}">
-        <p14:creationId xmlns:p14="http://schemas.microsoft.com/office/powerpoint/2010/main" val="22761770"/>
+        <p14:creationId xmlns:p14="http://schemas.microsoft.com/office/powerpoint/2010/main" val="1001757971"/>
       </p:ext>
     </p:extLst>
   </p:cSld>

</xml_diff>